<commit_message>
crop chap7_fig13, chap10_fig13, chap11_fig4; change chap_7_fig14 gif to two images
</commit_message>
<xml_diff>
--- a/figures/planning/Yixuan_chap11.pptx
+++ b/figures/planning/Yixuan_chap11.pptx
@@ -6,6 +6,7 @@
   </p:sldMasterIdLst>
   <p:sldIdLst>
     <p:sldId id="256" r:id="rId2"/>
+    <p:sldId id="257" r:id="rId3"/>
   </p:sldIdLst>
   <p:sldSz cx="12192000" cy="6858000"/>
   <p:notesSz cx="6858000" cy="9144000"/>
@@ -104,6 +105,11 @@
       </a:defRPr>
     </a:lvl9pPr>
   </p:defaultTextStyle>
+  <p:extLst>
+    <p:ext uri="{EFAFB233-063F-42B5-8137-9DF3F51BA10A}">
+      <p15:sldGuideLst xmlns:p15="http://schemas.microsoft.com/office/powerpoint/2012/main"/>
+    </p:ext>
+  </p:extLst>
 </p:presentation>
 </file>
 
@@ -254,7 +260,7 @@
           <a:p>
             <a:fld id="{3A84BA4E-469E-5F47-AD9B-2DCACC25D4EA}" type="datetimeFigureOut">
               <a:rPr lang="en-US" smtClean="0"/>
-              <a:t>12/26/21</a:t>
+              <a:t>1/29/22</a:t>
             </a:fld>
             <a:endParaRPr lang="en-US"/>
           </a:p>
@@ -452,7 +458,7 @@
           <a:p>
             <a:fld id="{3A84BA4E-469E-5F47-AD9B-2DCACC25D4EA}" type="datetimeFigureOut">
               <a:rPr lang="en-US" smtClean="0"/>
-              <a:t>12/26/21</a:t>
+              <a:t>1/29/22</a:t>
             </a:fld>
             <a:endParaRPr lang="en-US"/>
           </a:p>
@@ -660,7 +666,7 @@
           <a:p>
             <a:fld id="{3A84BA4E-469E-5F47-AD9B-2DCACC25D4EA}" type="datetimeFigureOut">
               <a:rPr lang="en-US" smtClean="0"/>
-              <a:t>12/26/21</a:t>
+              <a:t>1/29/22</a:t>
             </a:fld>
             <a:endParaRPr lang="en-US"/>
           </a:p>
@@ -858,7 +864,7 @@
           <a:p>
             <a:fld id="{3A84BA4E-469E-5F47-AD9B-2DCACC25D4EA}" type="datetimeFigureOut">
               <a:rPr lang="en-US" smtClean="0"/>
-              <a:t>12/26/21</a:t>
+              <a:t>1/29/22</a:t>
             </a:fld>
             <a:endParaRPr lang="en-US"/>
           </a:p>
@@ -1133,7 +1139,7 @@
           <a:p>
             <a:fld id="{3A84BA4E-469E-5F47-AD9B-2DCACC25D4EA}" type="datetimeFigureOut">
               <a:rPr lang="en-US" smtClean="0"/>
-              <a:t>12/26/21</a:t>
+              <a:t>1/29/22</a:t>
             </a:fld>
             <a:endParaRPr lang="en-US"/>
           </a:p>
@@ -1398,7 +1404,7 @@
           <a:p>
             <a:fld id="{3A84BA4E-469E-5F47-AD9B-2DCACC25D4EA}" type="datetimeFigureOut">
               <a:rPr lang="en-US" smtClean="0"/>
-              <a:t>12/26/21</a:t>
+              <a:t>1/29/22</a:t>
             </a:fld>
             <a:endParaRPr lang="en-US"/>
           </a:p>
@@ -1810,7 +1816,7 @@
           <a:p>
             <a:fld id="{3A84BA4E-469E-5F47-AD9B-2DCACC25D4EA}" type="datetimeFigureOut">
               <a:rPr lang="en-US" smtClean="0"/>
-              <a:t>12/26/21</a:t>
+              <a:t>1/29/22</a:t>
             </a:fld>
             <a:endParaRPr lang="en-US"/>
           </a:p>
@@ -1951,7 +1957,7 @@
           <a:p>
             <a:fld id="{3A84BA4E-469E-5F47-AD9B-2DCACC25D4EA}" type="datetimeFigureOut">
               <a:rPr lang="en-US" smtClean="0"/>
-              <a:t>12/26/21</a:t>
+              <a:t>1/29/22</a:t>
             </a:fld>
             <a:endParaRPr lang="en-US"/>
           </a:p>
@@ -2064,7 +2070,7 @@
           <a:p>
             <a:fld id="{3A84BA4E-469E-5F47-AD9B-2DCACC25D4EA}" type="datetimeFigureOut">
               <a:rPr lang="en-US" smtClean="0"/>
-              <a:t>12/26/21</a:t>
+              <a:t>1/29/22</a:t>
             </a:fld>
             <a:endParaRPr lang="en-US"/>
           </a:p>
@@ -2375,7 +2381,7 @@
           <a:p>
             <a:fld id="{3A84BA4E-469E-5F47-AD9B-2DCACC25D4EA}" type="datetimeFigureOut">
               <a:rPr lang="en-US" smtClean="0"/>
-              <a:t>12/26/21</a:t>
+              <a:t>1/29/22</a:t>
             </a:fld>
             <a:endParaRPr lang="en-US"/>
           </a:p>
@@ -2663,7 +2669,7 @@
           <a:p>
             <a:fld id="{3A84BA4E-469E-5F47-AD9B-2DCACC25D4EA}" type="datetimeFigureOut">
               <a:rPr lang="en-US" smtClean="0"/>
-              <a:t>12/26/21</a:t>
+              <a:t>1/29/22</a:t>
             </a:fld>
             <a:endParaRPr lang="en-US"/>
           </a:p>
@@ -2904,7 +2910,7 @@
           <a:p>
             <a:fld id="{3A84BA4E-469E-5F47-AD9B-2DCACC25D4EA}" type="datetimeFigureOut">
               <a:rPr lang="en-US" smtClean="0"/>
-              <a:t>12/26/21</a:t>
+              <a:t>1/29/22</a:t>
             </a:fld>
             <a:endParaRPr lang="en-US"/>
           </a:p>
@@ -3934,7 +3940,7 @@
         </p:nvSpPr>
         <p:spPr>
           <a:xfrm>
-            <a:off x="6304878" y="2915586"/>
+            <a:off x="4828264" y="2915586"/>
             <a:ext cx="91440" cy="91440"/>
           </a:xfrm>
           <a:prstGeom prst="ellipse">
@@ -3985,7 +3991,7 @@
         </p:nvSpPr>
         <p:spPr>
           <a:xfrm>
-            <a:off x="6865645" y="3133060"/>
+            <a:off x="5389031" y="3133060"/>
             <a:ext cx="91440" cy="91440"/>
           </a:xfrm>
           <a:prstGeom prst="ellipse">
@@ -4036,7 +4042,7 @@
         </p:nvSpPr>
         <p:spPr>
           <a:xfrm>
-            <a:off x="7103105" y="3625702"/>
+            <a:off x="5626491" y="3625702"/>
             <a:ext cx="91440" cy="91440"/>
           </a:xfrm>
           <a:prstGeom prst="ellipse">
@@ -4087,7 +4093,7 @@
         </p:nvSpPr>
         <p:spPr>
           <a:xfrm>
-            <a:off x="7315756" y="3232867"/>
+            <a:off x="5839142" y="3232867"/>
             <a:ext cx="91440" cy="91440"/>
           </a:xfrm>
           <a:prstGeom prst="ellipse">
@@ -4138,7 +4144,7 @@
         </p:nvSpPr>
         <p:spPr>
           <a:xfrm>
-            <a:off x="6539541" y="2382377"/>
+            <a:off x="5062927" y="2382377"/>
             <a:ext cx="91440" cy="91440"/>
           </a:xfrm>
           <a:prstGeom prst="ellipse">
@@ -4189,7 +4195,7 @@
         </p:nvSpPr>
         <p:spPr>
           <a:xfrm>
-            <a:off x="5666928" y="2473817"/>
+            <a:off x="4190314" y="2473817"/>
             <a:ext cx="91440" cy="91440"/>
           </a:xfrm>
           <a:prstGeom prst="ellipse">
@@ -4240,7 +4246,7 @@
         </p:nvSpPr>
         <p:spPr>
           <a:xfrm>
-            <a:off x="5848824" y="3420633"/>
+            <a:off x="4372210" y="3420633"/>
             <a:ext cx="91440" cy="91440"/>
           </a:xfrm>
           <a:prstGeom prst="ellipse">
@@ -4345,7 +4351,7 @@
         </p:nvSpPr>
         <p:spPr>
           <a:xfrm>
-            <a:off x="7103105" y="1992537"/>
+            <a:off x="5626491" y="1992537"/>
             <a:ext cx="91440" cy="91440"/>
           </a:xfrm>
           <a:prstGeom prst="ellipse">
@@ -4397,7 +4403,7 @@
         </p:nvSpPr>
         <p:spPr>
           <a:xfrm>
-            <a:off x="5751871" y="2521974"/>
+            <a:off x="4275257" y="2521974"/>
             <a:ext cx="589935" cy="398207"/>
           </a:xfrm>
           <a:custGeom>
@@ -4479,7 +4485,7 @@
         </p:nvSpPr>
         <p:spPr>
           <a:xfrm>
-            <a:off x="5888918" y="2993923"/>
+            <a:off x="4412304" y="2993923"/>
             <a:ext cx="423392" cy="435077"/>
           </a:xfrm>
           <a:custGeom>
@@ -4561,7 +4567,7 @@
         </p:nvSpPr>
         <p:spPr>
           <a:xfrm>
-            <a:off x="6386052" y="2964426"/>
+            <a:off x="4909438" y="2964426"/>
             <a:ext cx="471948" cy="271630"/>
           </a:xfrm>
           <a:custGeom>
@@ -4643,7 +4649,7 @@
         </p:nvSpPr>
         <p:spPr>
           <a:xfrm>
-            <a:off x="6946490" y="3073276"/>
+            <a:off x="5469876" y="3073276"/>
             <a:ext cx="383458" cy="171369"/>
           </a:xfrm>
           <a:custGeom>
@@ -4725,7 +4731,7 @@
         </p:nvSpPr>
         <p:spPr>
           <a:xfrm>
-            <a:off x="6869818" y="3215148"/>
+            <a:off x="5393204" y="3215148"/>
             <a:ext cx="246279" cy="435078"/>
           </a:xfrm>
           <a:custGeom>
@@ -4807,7 +4813,7 @@
         </p:nvSpPr>
         <p:spPr>
           <a:xfrm>
-            <a:off x="6363929" y="2462981"/>
+            <a:off x="4887315" y="2462981"/>
             <a:ext cx="309716" cy="457200"/>
           </a:xfrm>
           <a:custGeom>
@@ -4889,7 +4895,7 @@
         </p:nvSpPr>
         <p:spPr>
           <a:xfrm>
-            <a:off x="2775098" y="3967317"/>
+            <a:off x="2775098" y="3767285"/>
             <a:ext cx="544701" cy="369332"/>
           </a:xfrm>
           <a:prstGeom prst="rect">
@@ -4924,7 +4930,7 @@
         </p:nvSpPr>
         <p:spPr>
           <a:xfrm>
-            <a:off x="5769711" y="3966012"/>
+            <a:off x="4293097" y="3765980"/>
             <a:ext cx="1807867" cy="369332"/>
           </a:xfrm>
           <a:prstGeom prst="rect">
@@ -5090,7 +5096,7 @@
         </p:nvSpPr>
         <p:spPr>
           <a:xfrm>
-            <a:off x="6539541" y="2382377"/>
+            <a:off x="5062927" y="2382377"/>
             <a:ext cx="91440" cy="91440"/>
           </a:xfrm>
           <a:prstGeom prst="ellipse">
@@ -5142,7 +5148,7 @@
         </p:nvSpPr>
         <p:spPr>
           <a:xfrm>
-            <a:off x="5519447" y="1166446"/>
+            <a:off x="4042833" y="1166446"/>
             <a:ext cx="2660152" cy="369332"/>
           </a:xfrm>
           <a:prstGeom prst="rect">
@@ -5177,7 +5183,7 @@
         </p:nvSpPr>
         <p:spPr>
           <a:xfrm>
-            <a:off x="6614652" y="2219876"/>
+            <a:off x="5138038" y="2219876"/>
             <a:ext cx="766916" cy="169363"/>
           </a:xfrm>
           <a:custGeom>
@@ -5259,7 +5265,7 @@
         </p:nvSpPr>
         <p:spPr>
           <a:xfrm>
-            <a:off x="6607277" y="2072148"/>
+            <a:off x="5130663" y="2072148"/>
             <a:ext cx="420329" cy="309717"/>
           </a:xfrm>
           <a:custGeom>
@@ -5341,7 +5347,7 @@
         </p:nvSpPr>
         <p:spPr>
           <a:xfrm>
-            <a:off x="6599903" y="1755058"/>
+            <a:off x="5123289" y="1755058"/>
             <a:ext cx="243075" cy="626807"/>
           </a:xfrm>
           <a:custGeom>
@@ -5425,7 +5431,7 @@
         </p:nvSpPr>
         <p:spPr>
           <a:xfrm>
-            <a:off x="6771954" y="1671677"/>
+            <a:off x="5295340" y="1671677"/>
             <a:ext cx="91440" cy="91440"/>
           </a:xfrm>
           <a:prstGeom prst="ellipse">
@@ -5479,7 +5485,7 @@
         </p:nvSpPr>
         <p:spPr>
           <a:xfrm>
-            <a:off x="7381568" y="2231570"/>
+            <a:off x="5904954" y="2231570"/>
             <a:ext cx="91440" cy="91440"/>
           </a:xfrm>
           <a:prstGeom prst="ellipse">
@@ -5533,7 +5539,7 @@
         </p:nvSpPr>
         <p:spPr>
           <a:xfrm>
-            <a:off x="7011665" y="2015611"/>
+            <a:off x="5535051" y="2015611"/>
             <a:ext cx="91440" cy="91440"/>
           </a:xfrm>
           <a:prstGeom prst="ellipse">
@@ -6546,6 +6552,89 @@
 </p:sld>
 </file>
 
+<file path=ppt/slides/slide2.xml><?xml version="1.0" encoding="utf-8"?>
+<p:sld xmlns:a="http://schemas.openxmlformats.org/drawingml/2006/main" xmlns:r="http://schemas.openxmlformats.org/officeDocument/2006/relationships" xmlns:p="http://schemas.openxmlformats.org/presentationml/2006/main">
+  <p:cSld>
+    <p:spTree>
+      <p:nvGrpSpPr>
+        <p:cNvPr id="1" name=""/>
+        <p:cNvGrpSpPr/>
+        <p:nvPr/>
+      </p:nvGrpSpPr>
+      <p:grpSpPr>
+        <a:xfrm>
+          <a:off x="0" y="0"/>
+          <a:ext cx="0" cy="0"/>
+          <a:chOff x="0" y="0"/>
+          <a:chExt cx="0" cy="0"/>
+        </a:xfrm>
+      </p:grpSpPr>
+      <p:sp>
+        <p:nvSpPr>
+          <p:cNvPr id="2" name="Title 1">
+            <a:extLst>
+              <a:ext uri="{FF2B5EF4-FFF2-40B4-BE49-F238E27FC236}">
+                <a16:creationId xmlns:a16="http://schemas.microsoft.com/office/drawing/2014/main" id="{06674BD7-FE62-8A4E-897F-5293C16367DE}"/>
+              </a:ext>
+            </a:extLst>
+          </p:cNvPr>
+          <p:cNvSpPr>
+            <a:spLocks noGrp="1"/>
+          </p:cNvSpPr>
+          <p:nvPr>
+            <p:ph type="title"/>
+          </p:nvPr>
+        </p:nvSpPr>
+        <p:spPr/>
+        <p:txBody>
+          <a:bodyPr/>
+          <a:lstStyle/>
+          <a:p>
+            <a:endParaRPr lang="en-US"/>
+          </a:p>
+        </p:txBody>
+      </p:sp>
+      <p:pic>
+        <p:nvPicPr>
+          <p:cNvPr id="5" name="Content Placeholder 4" descr="Diagram, schematic&#10;&#10;Description automatically generated">
+            <a:extLst>
+              <a:ext uri="{FF2B5EF4-FFF2-40B4-BE49-F238E27FC236}">
+                <a16:creationId xmlns:a16="http://schemas.microsoft.com/office/drawing/2014/main" id="{E30FE6BE-E48D-6D40-A49E-DEF2FCB6D64D}"/>
+              </a:ext>
+            </a:extLst>
+          </p:cNvPr>
+          <p:cNvPicPr>
+            <a:picLocks noGrp="1" noChangeAspect="1"/>
+          </p:cNvPicPr>
+          <p:nvPr>
+            <p:ph idx="1"/>
+          </p:nvPr>
+        </p:nvPicPr>
+        <p:blipFill rotWithShape="1">
+          <a:blip r:embed="rId2"/>
+          <a:srcRect l="17275" t="9353" r="21528" b="4709"/>
+          <a:stretch/>
+        </p:blipFill>
+        <p:spPr>
+          <a:xfrm>
+            <a:off x="4300538" y="2514600"/>
+            <a:ext cx="3357562" cy="3143250"/>
+          </a:xfrm>
+        </p:spPr>
+      </p:pic>
+    </p:spTree>
+    <p:extLst>
+      <p:ext uri="{BB962C8B-B14F-4D97-AF65-F5344CB8AC3E}">
+        <p14:creationId xmlns:p14="http://schemas.microsoft.com/office/powerpoint/2010/main" val="625669473"/>
+      </p:ext>
+    </p:extLst>
+  </p:cSld>
+  <p:clrMapOvr>
+    <a:masterClrMapping/>
+  </p:clrMapOvr>
+</p:sld>
+</file>
+
 <file path=ppt/theme/theme1.xml><?xml version="1.0" encoding="utf-8"?>
 <a:theme xmlns:a="http://schemas.openxmlformats.org/drawingml/2006/main" name="Office Theme">
   <a:themeElements>

</xml_diff>

<commit_message>
add highlighting in chap7_fig14 and smooth chap11_fig4 kinodynamic rrt tree
</commit_message>
<xml_diff>
--- a/figures/planning/Yixuan_chap11.pptx
+++ b/figures/planning/Yixuan_chap11.pptx
@@ -260,7 +260,7 @@
           <a:p>
             <a:fld id="{3A84BA4E-469E-5F47-AD9B-2DCACC25D4EA}" type="datetimeFigureOut">
               <a:rPr lang="en-US" smtClean="0"/>
-              <a:t>1/29/22</a:t>
+              <a:t>2/4/22</a:t>
             </a:fld>
             <a:endParaRPr lang="en-US"/>
           </a:p>
@@ -458,7 +458,7 @@
           <a:p>
             <a:fld id="{3A84BA4E-469E-5F47-AD9B-2DCACC25D4EA}" type="datetimeFigureOut">
               <a:rPr lang="en-US" smtClean="0"/>
-              <a:t>1/29/22</a:t>
+              <a:t>2/4/22</a:t>
             </a:fld>
             <a:endParaRPr lang="en-US"/>
           </a:p>
@@ -666,7 +666,7 @@
           <a:p>
             <a:fld id="{3A84BA4E-469E-5F47-AD9B-2DCACC25D4EA}" type="datetimeFigureOut">
               <a:rPr lang="en-US" smtClean="0"/>
-              <a:t>1/29/22</a:t>
+              <a:t>2/4/22</a:t>
             </a:fld>
             <a:endParaRPr lang="en-US"/>
           </a:p>
@@ -864,7 +864,7 @@
           <a:p>
             <a:fld id="{3A84BA4E-469E-5F47-AD9B-2DCACC25D4EA}" type="datetimeFigureOut">
               <a:rPr lang="en-US" smtClean="0"/>
-              <a:t>1/29/22</a:t>
+              <a:t>2/4/22</a:t>
             </a:fld>
             <a:endParaRPr lang="en-US"/>
           </a:p>
@@ -1139,7 +1139,7 @@
           <a:p>
             <a:fld id="{3A84BA4E-469E-5F47-AD9B-2DCACC25D4EA}" type="datetimeFigureOut">
               <a:rPr lang="en-US" smtClean="0"/>
-              <a:t>1/29/22</a:t>
+              <a:t>2/4/22</a:t>
             </a:fld>
             <a:endParaRPr lang="en-US"/>
           </a:p>
@@ -1404,7 +1404,7 @@
           <a:p>
             <a:fld id="{3A84BA4E-469E-5F47-AD9B-2DCACC25D4EA}" type="datetimeFigureOut">
               <a:rPr lang="en-US" smtClean="0"/>
-              <a:t>1/29/22</a:t>
+              <a:t>2/4/22</a:t>
             </a:fld>
             <a:endParaRPr lang="en-US"/>
           </a:p>
@@ -1816,7 +1816,7 @@
           <a:p>
             <a:fld id="{3A84BA4E-469E-5F47-AD9B-2DCACC25D4EA}" type="datetimeFigureOut">
               <a:rPr lang="en-US" smtClean="0"/>
-              <a:t>1/29/22</a:t>
+              <a:t>2/4/22</a:t>
             </a:fld>
             <a:endParaRPr lang="en-US"/>
           </a:p>
@@ -1957,7 +1957,7 @@
           <a:p>
             <a:fld id="{3A84BA4E-469E-5F47-AD9B-2DCACC25D4EA}" type="datetimeFigureOut">
               <a:rPr lang="en-US" smtClean="0"/>
-              <a:t>1/29/22</a:t>
+              <a:t>2/4/22</a:t>
             </a:fld>
             <a:endParaRPr lang="en-US"/>
           </a:p>
@@ -2070,7 +2070,7 @@
           <a:p>
             <a:fld id="{3A84BA4E-469E-5F47-AD9B-2DCACC25D4EA}" type="datetimeFigureOut">
               <a:rPr lang="en-US" smtClean="0"/>
-              <a:t>1/29/22</a:t>
+              <a:t>2/4/22</a:t>
             </a:fld>
             <a:endParaRPr lang="en-US"/>
           </a:p>
@@ -2381,7 +2381,7 @@
           <a:p>
             <a:fld id="{3A84BA4E-469E-5F47-AD9B-2DCACC25D4EA}" type="datetimeFigureOut">
               <a:rPr lang="en-US" smtClean="0"/>
-              <a:t>1/29/22</a:t>
+              <a:t>2/4/22</a:t>
             </a:fld>
             <a:endParaRPr lang="en-US"/>
           </a:p>
@@ -2669,7 +2669,7 @@
           <a:p>
             <a:fld id="{3A84BA4E-469E-5F47-AD9B-2DCACC25D4EA}" type="datetimeFigureOut">
               <a:rPr lang="en-US" smtClean="0"/>
-              <a:t>1/29/22</a:t>
+              <a:t>2/4/22</a:t>
             </a:fld>
             <a:endParaRPr lang="en-US"/>
           </a:p>
@@ -2910,7 +2910,7 @@
           <a:p>
             <a:fld id="{3A84BA4E-469E-5F47-AD9B-2DCACC25D4EA}" type="datetimeFigureOut">
               <a:rPr lang="en-US" smtClean="0"/>
-              <a:t>1/29/22</a:t>
+              <a:t>2/4/22</a:t>
             </a:fld>
             <a:endParaRPr lang="en-US"/>
           </a:p>
@@ -3940,7 +3940,7 @@
         </p:nvSpPr>
         <p:spPr>
           <a:xfrm>
-            <a:off x="4828264" y="2915586"/>
+            <a:off x="4848583" y="2922359"/>
             <a:ext cx="91440" cy="91440"/>
           </a:xfrm>
           <a:prstGeom prst="ellipse">
@@ -3991,7 +3991,7 @@
         </p:nvSpPr>
         <p:spPr>
           <a:xfrm>
-            <a:off x="5389031" y="3133060"/>
+            <a:off x="5286784" y="3148193"/>
             <a:ext cx="91440" cy="91440"/>
           </a:xfrm>
           <a:prstGeom prst="ellipse">
@@ -4042,7 +4042,7 @@
         </p:nvSpPr>
         <p:spPr>
           <a:xfrm>
-            <a:off x="5626491" y="3625702"/>
+            <a:off x="5361870" y="3609530"/>
             <a:ext cx="91440" cy="91440"/>
           </a:xfrm>
           <a:prstGeom prst="ellipse">
@@ -4093,7 +4093,7 @@
         </p:nvSpPr>
         <p:spPr>
           <a:xfrm>
-            <a:off x="5839142" y="3232867"/>
+            <a:off x="5670818" y="3335897"/>
             <a:ext cx="91440" cy="91440"/>
           </a:xfrm>
           <a:prstGeom prst="ellipse">
@@ -4144,7 +4144,7 @@
         </p:nvSpPr>
         <p:spPr>
           <a:xfrm>
-            <a:off x="5062927" y="2382377"/>
+            <a:off x="5435462" y="2700719"/>
             <a:ext cx="91440" cy="91440"/>
           </a:xfrm>
           <a:prstGeom prst="ellipse">
@@ -4195,7 +4195,7 @@
         </p:nvSpPr>
         <p:spPr>
           <a:xfrm>
-            <a:off x="4190314" y="2473817"/>
+            <a:off x="4288013" y="2486637"/>
             <a:ext cx="91440" cy="91440"/>
           </a:xfrm>
           <a:prstGeom prst="ellipse">
@@ -4246,7 +4246,7 @@
         </p:nvSpPr>
         <p:spPr>
           <a:xfrm>
-            <a:off x="4372210" y="3420633"/>
+            <a:off x="4358126" y="3350951"/>
             <a:ext cx="91440" cy="91440"/>
           </a:xfrm>
           <a:prstGeom prst="ellipse">
@@ -4351,7 +4351,7 @@
         </p:nvSpPr>
         <p:spPr>
           <a:xfrm>
-            <a:off x="5626491" y="1992537"/>
+            <a:off x="5999026" y="2310879"/>
             <a:ext cx="91440" cy="91440"/>
           </a:xfrm>
           <a:prstGeom prst="ellipse">
@@ -4391,498 +4391,6 @@
       </p:sp>
       <p:sp>
         <p:nvSpPr>
-          <p:cNvPr id="48" name="Freeform 47">
-            <a:extLst>
-              <a:ext uri="{FF2B5EF4-FFF2-40B4-BE49-F238E27FC236}">
-                <a16:creationId xmlns:a16="http://schemas.microsoft.com/office/drawing/2014/main" id="{BEED7A25-1974-314C-AEC9-D92EBD1EE277}"/>
-              </a:ext>
-            </a:extLst>
-          </p:cNvPr>
-          <p:cNvSpPr/>
-          <p:nvPr/>
-        </p:nvSpPr>
-        <p:spPr>
-          <a:xfrm>
-            <a:off x="4275257" y="2521974"/>
-            <a:ext cx="589935" cy="398207"/>
-          </a:xfrm>
-          <a:custGeom>
-            <a:avLst/>
-            <a:gdLst>
-              <a:gd name="connsiteX0" fmla="*/ 0 w 589935"/>
-              <a:gd name="connsiteY0" fmla="*/ 0 h 398207"/>
-              <a:gd name="connsiteX1" fmla="*/ 361335 w 589935"/>
-              <a:gd name="connsiteY1" fmla="*/ 81116 h 398207"/>
-              <a:gd name="connsiteX2" fmla="*/ 589935 w 589935"/>
-              <a:gd name="connsiteY2" fmla="*/ 398207 h 398207"/>
-            </a:gdLst>
-            <a:ahLst/>
-            <a:cxnLst>
-              <a:cxn ang="0">
-                <a:pos x="connsiteX0" y="connsiteY0"/>
-              </a:cxn>
-              <a:cxn ang="0">
-                <a:pos x="connsiteX1" y="connsiteY1"/>
-              </a:cxn>
-              <a:cxn ang="0">
-                <a:pos x="connsiteX2" y="connsiteY2"/>
-              </a:cxn>
-            </a:cxnLst>
-            <a:rect l="l" t="t" r="r" b="b"/>
-            <a:pathLst>
-              <a:path w="589935" h="398207">
-                <a:moveTo>
-                  <a:pt x="0" y="0"/>
-                </a:moveTo>
-                <a:cubicBezTo>
-                  <a:pt x="131506" y="7374"/>
-                  <a:pt x="263013" y="14748"/>
-                  <a:pt x="361335" y="81116"/>
-                </a:cubicBezTo>
-                <a:cubicBezTo>
-                  <a:pt x="459657" y="147484"/>
-                  <a:pt x="524796" y="272845"/>
-                  <a:pt x="589935" y="398207"/>
-                </a:cubicBezTo>
-              </a:path>
-            </a:pathLst>
-          </a:custGeom>
-        </p:spPr>
-        <p:style>
-          <a:lnRef idx="1">
-            <a:schemeClr val="dk1"/>
-          </a:lnRef>
-          <a:fillRef idx="0">
-            <a:schemeClr val="dk1"/>
-          </a:fillRef>
-          <a:effectRef idx="0">
-            <a:schemeClr val="dk1"/>
-          </a:effectRef>
-          <a:fontRef idx="minor">
-            <a:schemeClr val="tx1"/>
-          </a:fontRef>
-        </p:style>
-        <p:txBody>
-          <a:bodyPr rtlCol="0" anchor="ctr"/>
-          <a:lstStyle/>
-          <a:p>
-            <a:pPr algn="ctr"/>
-            <a:endParaRPr lang="en-US"/>
-          </a:p>
-        </p:txBody>
-      </p:sp>
-      <p:sp>
-        <p:nvSpPr>
-          <p:cNvPr id="50" name="Freeform 49">
-            <a:extLst>
-              <a:ext uri="{FF2B5EF4-FFF2-40B4-BE49-F238E27FC236}">
-                <a16:creationId xmlns:a16="http://schemas.microsoft.com/office/drawing/2014/main" id="{A3407A60-2776-8D44-B8D5-DF4C6D7C5406}"/>
-              </a:ext>
-            </a:extLst>
-          </p:cNvPr>
-          <p:cNvSpPr/>
-          <p:nvPr/>
-        </p:nvSpPr>
-        <p:spPr>
-          <a:xfrm>
-            <a:off x="4412304" y="2993923"/>
-            <a:ext cx="423392" cy="435077"/>
-          </a:xfrm>
-          <a:custGeom>
-            <a:avLst/>
-            <a:gdLst>
-              <a:gd name="connsiteX0" fmla="*/ 423392 w 423392"/>
-              <a:gd name="connsiteY0" fmla="*/ 0 h 435077"/>
-              <a:gd name="connsiteX1" fmla="*/ 113676 w 423392"/>
-              <a:gd name="connsiteY1" fmla="*/ 88490 h 435077"/>
-              <a:gd name="connsiteX2" fmla="*/ 3063 w 423392"/>
-              <a:gd name="connsiteY2" fmla="*/ 435077 h 435077"/>
-            </a:gdLst>
-            <a:ahLst/>
-            <a:cxnLst>
-              <a:cxn ang="0">
-                <a:pos x="connsiteX0" y="connsiteY0"/>
-              </a:cxn>
-              <a:cxn ang="0">
-                <a:pos x="connsiteX1" y="connsiteY1"/>
-              </a:cxn>
-              <a:cxn ang="0">
-                <a:pos x="connsiteX2" y="connsiteY2"/>
-              </a:cxn>
-            </a:cxnLst>
-            <a:rect l="l" t="t" r="r" b="b"/>
-            <a:pathLst>
-              <a:path w="423392" h="435077">
-                <a:moveTo>
-                  <a:pt x="423392" y="0"/>
-                </a:moveTo>
-                <a:cubicBezTo>
-                  <a:pt x="303561" y="7988"/>
-                  <a:pt x="183731" y="15977"/>
-                  <a:pt x="113676" y="88490"/>
-                </a:cubicBezTo>
-                <a:cubicBezTo>
-                  <a:pt x="43621" y="161003"/>
-                  <a:pt x="-14143" y="331838"/>
-                  <a:pt x="3063" y="435077"/>
-                </a:cubicBezTo>
-              </a:path>
-            </a:pathLst>
-          </a:custGeom>
-        </p:spPr>
-        <p:style>
-          <a:lnRef idx="1">
-            <a:schemeClr val="dk1"/>
-          </a:lnRef>
-          <a:fillRef idx="0">
-            <a:schemeClr val="dk1"/>
-          </a:fillRef>
-          <a:effectRef idx="0">
-            <a:schemeClr val="dk1"/>
-          </a:effectRef>
-          <a:fontRef idx="minor">
-            <a:schemeClr val="tx1"/>
-          </a:fontRef>
-        </p:style>
-        <p:txBody>
-          <a:bodyPr rtlCol="0" anchor="ctr"/>
-          <a:lstStyle/>
-          <a:p>
-            <a:pPr algn="ctr"/>
-            <a:endParaRPr lang="en-US"/>
-          </a:p>
-        </p:txBody>
-      </p:sp>
-      <p:sp>
-        <p:nvSpPr>
-          <p:cNvPr id="51" name="Freeform 50">
-            <a:extLst>
-              <a:ext uri="{FF2B5EF4-FFF2-40B4-BE49-F238E27FC236}">
-                <a16:creationId xmlns:a16="http://schemas.microsoft.com/office/drawing/2014/main" id="{5DA632B2-6F66-F241-B395-69C886686C8D}"/>
-              </a:ext>
-            </a:extLst>
-          </p:cNvPr>
-          <p:cNvSpPr/>
-          <p:nvPr/>
-        </p:nvSpPr>
-        <p:spPr>
-          <a:xfrm>
-            <a:off x="4909438" y="2964426"/>
-            <a:ext cx="471948" cy="271630"/>
-          </a:xfrm>
-          <a:custGeom>
-            <a:avLst/>
-            <a:gdLst>
-              <a:gd name="connsiteX0" fmla="*/ 0 w 471948"/>
-              <a:gd name="connsiteY0" fmla="*/ 0 h 271630"/>
-              <a:gd name="connsiteX1" fmla="*/ 213851 w 471948"/>
-              <a:gd name="connsiteY1" fmla="*/ 258097 h 271630"/>
-              <a:gd name="connsiteX2" fmla="*/ 471948 w 471948"/>
-              <a:gd name="connsiteY2" fmla="*/ 213851 h 271630"/>
-            </a:gdLst>
-            <a:ahLst/>
-            <a:cxnLst>
-              <a:cxn ang="0">
-                <a:pos x="connsiteX0" y="connsiteY0"/>
-              </a:cxn>
-              <a:cxn ang="0">
-                <a:pos x="connsiteX1" y="connsiteY1"/>
-              </a:cxn>
-              <a:cxn ang="0">
-                <a:pos x="connsiteX2" y="connsiteY2"/>
-              </a:cxn>
-            </a:cxnLst>
-            <a:rect l="l" t="t" r="r" b="b"/>
-            <a:pathLst>
-              <a:path w="471948" h="271630">
-                <a:moveTo>
-                  <a:pt x="0" y="0"/>
-                </a:moveTo>
-                <a:cubicBezTo>
-                  <a:pt x="67596" y="111227"/>
-                  <a:pt x="135193" y="222455"/>
-                  <a:pt x="213851" y="258097"/>
-                </a:cubicBezTo>
-                <a:cubicBezTo>
-                  <a:pt x="292509" y="293739"/>
-                  <a:pt x="385916" y="251951"/>
-                  <a:pt x="471948" y="213851"/>
-                </a:cubicBezTo>
-              </a:path>
-            </a:pathLst>
-          </a:custGeom>
-        </p:spPr>
-        <p:style>
-          <a:lnRef idx="1">
-            <a:schemeClr val="dk1"/>
-          </a:lnRef>
-          <a:fillRef idx="0">
-            <a:schemeClr val="dk1"/>
-          </a:fillRef>
-          <a:effectRef idx="0">
-            <a:schemeClr val="dk1"/>
-          </a:effectRef>
-          <a:fontRef idx="minor">
-            <a:schemeClr val="tx1"/>
-          </a:fontRef>
-        </p:style>
-        <p:txBody>
-          <a:bodyPr rtlCol="0" anchor="ctr"/>
-          <a:lstStyle/>
-          <a:p>
-            <a:pPr algn="ctr"/>
-            <a:endParaRPr lang="en-US"/>
-          </a:p>
-        </p:txBody>
-      </p:sp>
-      <p:sp>
-        <p:nvSpPr>
-          <p:cNvPr id="52" name="Freeform 51">
-            <a:extLst>
-              <a:ext uri="{FF2B5EF4-FFF2-40B4-BE49-F238E27FC236}">
-                <a16:creationId xmlns:a16="http://schemas.microsoft.com/office/drawing/2014/main" id="{C942A5AA-4A48-C24D-AEAF-5DCA0F5CF426}"/>
-              </a:ext>
-            </a:extLst>
-          </p:cNvPr>
-          <p:cNvSpPr/>
-          <p:nvPr/>
-        </p:nvSpPr>
-        <p:spPr>
-          <a:xfrm>
-            <a:off x="5469876" y="3073276"/>
-            <a:ext cx="383458" cy="171369"/>
-          </a:xfrm>
-          <a:custGeom>
-            <a:avLst/>
-            <a:gdLst>
-              <a:gd name="connsiteX0" fmla="*/ 0 w 383458"/>
-              <a:gd name="connsiteY0" fmla="*/ 97627 h 171369"/>
-              <a:gd name="connsiteX1" fmla="*/ 213852 w 383458"/>
-              <a:gd name="connsiteY1" fmla="*/ 1763 h 171369"/>
-              <a:gd name="connsiteX2" fmla="*/ 383458 w 383458"/>
-              <a:gd name="connsiteY2" fmla="*/ 171369 h 171369"/>
-            </a:gdLst>
-            <a:ahLst/>
-            <a:cxnLst>
-              <a:cxn ang="0">
-                <a:pos x="connsiteX0" y="connsiteY0"/>
-              </a:cxn>
-              <a:cxn ang="0">
-                <a:pos x="connsiteX1" y="connsiteY1"/>
-              </a:cxn>
-              <a:cxn ang="0">
-                <a:pos x="connsiteX2" y="connsiteY2"/>
-              </a:cxn>
-            </a:cxnLst>
-            <a:rect l="l" t="t" r="r" b="b"/>
-            <a:pathLst>
-              <a:path w="383458" h="171369">
-                <a:moveTo>
-                  <a:pt x="0" y="97627"/>
-                </a:moveTo>
-                <a:cubicBezTo>
-                  <a:pt x="74971" y="43550"/>
-                  <a:pt x="149942" y="-10527"/>
-                  <a:pt x="213852" y="1763"/>
-                </a:cubicBezTo>
-                <a:cubicBezTo>
-                  <a:pt x="277762" y="14053"/>
-                  <a:pt x="344129" y="95169"/>
-                  <a:pt x="383458" y="171369"/>
-                </a:cubicBezTo>
-              </a:path>
-            </a:pathLst>
-          </a:custGeom>
-        </p:spPr>
-        <p:style>
-          <a:lnRef idx="1">
-            <a:schemeClr val="dk1"/>
-          </a:lnRef>
-          <a:fillRef idx="0">
-            <a:schemeClr val="dk1"/>
-          </a:fillRef>
-          <a:effectRef idx="0">
-            <a:schemeClr val="dk1"/>
-          </a:effectRef>
-          <a:fontRef idx="minor">
-            <a:schemeClr val="tx1"/>
-          </a:fontRef>
-        </p:style>
-        <p:txBody>
-          <a:bodyPr rtlCol="0" anchor="ctr"/>
-          <a:lstStyle/>
-          <a:p>
-            <a:pPr algn="ctr"/>
-            <a:endParaRPr lang="en-US"/>
-          </a:p>
-        </p:txBody>
-      </p:sp>
-      <p:sp>
-        <p:nvSpPr>
-          <p:cNvPr id="53" name="Freeform 52">
-            <a:extLst>
-              <a:ext uri="{FF2B5EF4-FFF2-40B4-BE49-F238E27FC236}">
-                <a16:creationId xmlns:a16="http://schemas.microsoft.com/office/drawing/2014/main" id="{5918462C-CFC2-E147-BFE3-6339CB304B5E}"/>
-              </a:ext>
-            </a:extLst>
-          </p:cNvPr>
-          <p:cNvSpPr/>
-          <p:nvPr/>
-        </p:nvSpPr>
-        <p:spPr>
-          <a:xfrm>
-            <a:off x="5393204" y="3215148"/>
-            <a:ext cx="246279" cy="435078"/>
-          </a:xfrm>
-          <a:custGeom>
-            <a:avLst/>
-            <a:gdLst>
-              <a:gd name="connsiteX0" fmla="*/ 32427 w 246279"/>
-              <a:gd name="connsiteY0" fmla="*/ 0 h 435078"/>
-              <a:gd name="connsiteX1" fmla="*/ 17679 w 246279"/>
-              <a:gd name="connsiteY1" fmla="*/ 221226 h 435078"/>
-              <a:gd name="connsiteX2" fmla="*/ 246279 w 246279"/>
-              <a:gd name="connsiteY2" fmla="*/ 435078 h 435078"/>
-            </a:gdLst>
-            <a:ahLst/>
-            <a:cxnLst>
-              <a:cxn ang="0">
-                <a:pos x="connsiteX0" y="connsiteY0"/>
-              </a:cxn>
-              <a:cxn ang="0">
-                <a:pos x="connsiteX1" y="connsiteY1"/>
-              </a:cxn>
-              <a:cxn ang="0">
-                <a:pos x="connsiteX2" y="connsiteY2"/>
-              </a:cxn>
-            </a:cxnLst>
-            <a:rect l="l" t="t" r="r" b="b"/>
-            <a:pathLst>
-              <a:path w="246279" h="435078">
-                <a:moveTo>
-                  <a:pt x="32427" y="0"/>
-                </a:moveTo>
-                <a:cubicBezTo>
-                  <a:pt x="7232" y="74356"/>
-                  <a:pt x="-17963" y="148713"/>
-                  <a:pt x="17679" y="221226"/>
-                </a:cubicBezTo>
-                <a:cubicBezTo>
-                  <a:pt x="53321" y="293739"/>
-                  <a:pt x="131979" y="358878"/>
-                  <a:pt x="246279" y="435078"/>
-                </a:cubicBezTo>
-              </a:path>
-            </a:pathLst>
-          </a:custGeom>
-        </p:spPr>
-        <p:style>
-          <a:lnRef idx="1">
-            <a:schemeClr val="dk1"/>
-          </a:lnRef>
-          <a:fillRef idx="0">
-            <a:schemeClr val="dk1"/>
-          </a:fillRef>
-          <a:effectRef idx="0">
-            <a:schemeClr val="dk1"/>
-          </a:effectRef>
-          <a:fontRef idx="minor">
-            <a:schemeClr val="tx1"/>
-          </a:fontRef>
-        </p:style>
-        <p:txBody>
-          <a:bodyPr rtlCol="0" anchor="ctr"/>
-          <a:lstStyle/>
-          <a:p>
-            <a:pPr algn="ctr"/>
-            <a:endParaRPr lang="en-US"/>
-          </a:p>
-        </p:txBody>
-      </p:sp>
-      <p:sp>
-        <p:nvSpPr>
-          <p:cNvPr id="54" name="Freeform 53">
-            <a:extLst>
-              <a:ext uri="{FF2B5EF4-FFF2-40B4-BE49-F238E27FC236}">
-                <a16:creationId xmlns:a16="http://schemas.microsoft.com/office/drawing/2014/main" id="{7747CF8C-1ED0-A145-B3F9-8C10615F4B62}"/>
-              </a:ext>
-            </a:extLst>
-          </p:cNvPr>
-          <p:cNvSpPr/>
-          <p:nvPr/>
-        </p:nvSpPr>
-        <p:spPr>
-          <a:xfrm>
-            <a:off x="4887315" y="2462981"/>
-            <a:ext cx="309716" cy="457200"/>
-          </a:xfrm>
-          <a:custGeom>
-            <a:avLst/>
-            <a:gdLst>
-              <a:gd name="connsiteX0" fmla="*/ 0 w 309716"/>
-              <a:gd name="connsiteY0" fmla="*/ 457200 h 457200"/>
-              <a:gd name="connsiteX1" fmla="*/ 294968 w 309716"/>
-              <a:gd name="connsiteY1" fmla="*/ 339213 h 457200"/>
-              <a:gd name="connsiteX2" fmla="*/ 228600 w 309716"/>
-              <a:gd name="connsiteY2" fmla="*/ 0 h 457200"/>
-            </a:gdLst>
-            <a:ahLst/>
-            <a:cxnLst>
-              <a:cxn ang="0">
-                <a:pos x="connsiteX0" y="connsiteY0"/>
-              </a:cxn>
-              <a:cxn ang="0">
-                <a:pos x="connsiteX1" y="connsiteY1"/>
-              </a:cxn>
-              <a:cxn ang="0">
-                <a:pos x="connsiteX2" y="connsiteY2"/>
-              </a:cxn>
-            </a:cxnLst>
-            <a:rect l="l" t="t" r="r" b="b"/>
-            <a:pathLst>
-              <a:path w="309716" h="457200">
-                <a:moveTo>
-                  <a:pt x="0" y="457200"/>
-                </a:moveTo>
-                <a:cubicBezTo>
-                  <a:pt x="128434" y="436306"/>
-                  <a:pt x="256868" y="415413"/>
-                  <a:pt x="294968" y="339213"/>
-                </a:cubicBezTo>
-                <a:cubicBezTo>
-                  <a:pt x="333068" y="263013"/>
-                  <a:pt x="292510" y="95865"/>
-                  <a:pt x="228600" y="0"/>
-                </a:cubicBezTo>
-              </a:path>
-            </a:pathLst>
-          </a:custGeom>
-        </p:spPr>
-        <p:style>
-          <a:lnRef idx="1">
-            <a:schemeClr val="dk1"/>
-          </a:lnRef>
-          <a:fillRef idx="0">
-            <a:schemeClr val="dk1"/>
-          </a:fillRef>
-          <a:effectRef idx="0">
-            <a:schemeClr val="dk1"/>
-          </a:effectRef>
-          <a:fontRef idx="minor">
-            <a:schemeClr val="tx1"/>
-          </a:fontRef>
-        </p:style>
-        <p:txBody>
-          <a:bodyPr rtlCol="0" anchor="ctr"/>
-          <a:lstStyle/>
-          <a:p>
-            <a:pPr algn="ctr"/>
-            <a:endParaRPr lang="en-US"/>
-          </a:p>
-        </p:txBody>
-      </p:sp>
-      <p:sp>
-        <p:nvSpPr>
           <p:cNvPr id="55" name="TextBox 54">
             <a:extLst>
               <a:ext uri="{FF2B5EF4-FFF2-40B4-BE49-F238E27FC236}">
@@ -5096,7 +4604,7 @@
         </p:nvSpPr>
         <p:spPr>
           <a:xfrm>
-            <a:off x="5062927" y="2382377"/>
+            <a:off x="5435462" y="2700719"/>
             <a:ext cx="91440" cy="91440"/>
           </a:xfrm>
           <a:prstGeom prst="ellipse">
@@ -5171,267 +4679,21 @@
       </p:sp>
       <p:sp>
         <p:nvSpPr>
-          <p:cNvPr id="63" name="Freeform 62">
-            <a:extLst>
-              <a:ext uri="{FF2B5EF4-FFF2-40B4-BE49-F238E27FC236}">
-                <a16:creationId xmlns:a16="http://schemas.microsoft.com/office/drawing/2014/main" id="{1EB6A4DB-8783-A646-A62B-B51E5093DB2D}"/>
-              </a:ext>
-            </a:extLst>
-          </p:cNvPr>
-          <p:cNvSpPr/>
+          <p:cNvPr id="66" name="Oval 65">
+            <a:extLst>
+              <a:ext uri="{FF2B5EF4-FFF2-40B4-BE49-F238E27FC236}">
+                <a16:creationId xmlns:a16="http://schemas.microsoft.com/office/drawing/2014/main" id="{4EDBEB9A-425F-D240-94A9-02741E44CE33}"/>
+              </a:ext>
+            </a:extLst>
+          </p:cNvPr>
+          <p:cNvSpPr>
+            <a:spLocks noChangeAspect="1"/>
+          </p:cNvSpPr>
           <p:nvPr/>
         </p:nvSpPr>
         <p:spPr>
           <a:xfrm>
-            <a:off x="5138038" y="2219876"/>
-            <a:ext cx="766916" cy="169363"/>
-          </a:xfrm>
-          <a:custGeom>
-            <a:avLst/>
-            <a:gdLst>
-              <a:gd name="connsiteX0" fmla="*/ 0 w 766916"/>
-              <a:gd name="connsiteY0" fmla="*/ 169363 h 169363"/>
-              <a:gd name="connsiteX1" fmla="*/ 331838 w 766916"/>
-              <a:gd name="connsiteY1" fmla="*/ 7130 h 169363"/>
-              <a:gd name="connsiteX2" fmla="*/ 766916 w 766916"/>
-              <a:gd name="connsiteY2" fmla="*/ 44001 h 169363"/>
-            </a:gdLst>
-            <a:ahLst/>
-            <a:cxnLst>
-              <a:cxn ang="0">
-                <a:pos x="connsiteX0" y="connsiteY0"/>
-              </a:cxn>
-              <a:cxn ang="0">
-                <a:pos x="connsiteX1" y="connsiteY1"/>
-              </a:cxn>
-              <a:cxn ang="0">
-                <a:pos x="connsiteX2" y="connsiteY2"/>
-              </a:cxn>
-            </a:cxnLst>
-            <a:rect l="l" t="t" r="r" b="b"/>
-            <a:pathLst>
-              <a:path w="766916" h="169363">
-                <a:moveTo>
-                  <a:pt x="0" y="169363"/>
-                </a:moveTo>
-                <a:cubicBezTo>
-                  <a:pt x="102009" y="98693"/>
-                  <a:pt x="204019" y="28024"/>
-                  <a:pt x="331838" y="7130"/>
-                </a:cubicBezTo>
-                <a:cubicBezTo>
-                  <a:pt x="459657" y="-13764"/>
-                  <a:pt x="613286" y="15118"/>
-                  <a:pt x="766916" y="44001"/>
-                </a:cubicBezTo>
-              </a:path>
-            </a:pathLst>
-          </a:custGeom>
-        </p:spPr>
-        <p:style>
-          <a:lnRef idx="1">
-            <a:schemeClr val="dk1"/>
-          </a:lnRef>
-          <a:fillRef idx="0">
-            <a:schemeClr val="dk1"/>
-          </a:fillRef>
-          <a:effectRef idx="0">
-            <a:schemeClr val="dk1"/>
-          </a:effectRef>
-          <a:fontRef idx="minor">
-            <a:schemeClr val="tx1"/>
-          </a:fontRef>
-        </p:style>
-        <p:txBody>
-          <a:bodyPr rtlCol="0" anchor="ctr"/>
-          <a:lstStyle/>
-          <a:p>
-            <a:pPr algn="ctr"/>
-            <a:endParaRPr lang="en-US"/>
-          </a:p>
-        </p:txBody>
-      </p:sp>
-      <p:sp>
-        <p:nvSpPr>
-          <p:cNvPr id="64" name="Freeform 63">
-            <a:extLst>
-              <a:ext uri="{FF2B5EF4-FFF2-40B4-BE49-F238E27FC236}">
-                <a16:creationId xmlns:a16="http://schemas.microsoft.com/office/drawing/2014/main" id="{B770EA97-51CB-164B-BC47-DDD76FF7EC7A}"/>
-              </a:ext>
-            </a:extLst>
-          </p:cNvPr>
-          <p:cNvSpPr/>
-          <p:nvPr/>
-        </p:nvSpPr>
-        <p:spPr>
-          <a:xfrm>
-            <a:off x="5130663" y="2072148"/>
-            <a:ext cx="420329" cy="309717"/>
-          </a:xfrm>
-          <a:custGeom>
-            <a:avLst/>
-            <a:gdLst>
-              <a:gd name="connsiteX0" fmla="*/ 0 w 420329"/>
-              <a:gd name="connsiteY0" fmla="*/ 309717 h 309717"/>
-              <a:gd name="connsiteX1" fmla="*/ 176981 w 420329"/>
-              <a:gd name="connsiteY1" fmla="*/ 132736 h 309717"/>
-              <a:gd name="connsiteX2" fmla="*/ 420329 w 420329"/>
-              <a:gd name="connsiteY2" fmla="*/ 0 h 309717"/>
-            </a:gdLst>
-            <a:ahLst/>
-            <a:cxnLst>
-              <a:cxn ang="0">
-                <a:pos x="connsiteX0" y="connsiteY0"/>
-              </a:cxn>
-              <a:cxn ang="0">
-                <a:pos x="connsiteX1" y="connsiteY1"/>
-              </a:cxn>
-              <a:cxn ang="0">
-                <a:pos x="connsiteX2" y="connsiteY2"/>
-              </a:cxn>
-            </a:cxnLst>
-            <a:rect l="l" t="t" r="r" b="b"/>
-            <a:pathLst>
-              <a:path w="420329" h="309717">
-                <a:moveTo>
-                  <a:pt x="0" y="309717"/>
-                </a:moveTo>
-                <a:cubicBezTo>
-                  <a:pt x="53463" y="247036"/>
-                  <a:pt x="106926" y="184356"/>
-                  <a:pt x="176981" y="132736"/>
-                </a:cubicBezTo>
-                <a:cubicBezTo>
-                  <a:pt x="247036" y="81116"/>
-                  <a:pt x="333682" y="40558"/>
-                  <a:pt x="420329" y="0"/>
-                </a:cubicBezTo>
-              </a:path>
-            </a:pathLst>
-          </a:custGeom>
-        </p:spPr>
-        <p:style>
-          <a:lnRef idx="1">
-            <a:schemeClr val="dk1"/>
-          </a:lnRef>
-          <a:fillRef idx="0">
-            <a:schemeClr val="dk1"/>
-          </a:fillRef>
-          <a:effectRef idx="0">
-            <a:schemeClr val="dk1"/>
-          </a:effectRef>
-          <a:fontRef idx="minor">
-            <a:schemeClr val="tx1"/>
-          </a:fontRef>
-        </p:style>
-        <p:txBody>
-          <a:bodyPr rtlCol="0" anchor="ctr"/>
-          <a:lstStyle/>
-          <a:p>
-            <a:pPr algn="ctr"/>
-            <a:endParaRPr lang="en-US"/>
-          </a:p>
-        </p:txBody>
-      </p:sp>
-      <p:sp>
-        <p:nvSpPr>
-          <p:cNvPr id="65" name="Freeform 64">
-            <a:extLst>
-              <a:ext uri="{FF2B5EF4-FFF2-40B4-BE49-F238E27FC236}">
-                <a16:creationId xmlns:a16="http://schemas.microsoft.com/office/drawing/2014/main" id="{EEB80461-34E1-D94F-A664-FC536DA67412}"/>
-              </a:ext>
-            </a:extLst>
-          </p:cNvPr>
-          <p:cNvSpPr/>
-          <p:nvPr/>
-        </p:nvSpPr>
-        <p:spPr>
-          <a:xfrm>
-            <a:off x="5123289" y="1755058"/>
-            <a:ext cx="243075" cy="626807"/>
-          </a:xfrm>
-          <a:custGeom>
-            <a:avLst/>
-            <a:gdLst>
-              <a:gd name="connsiteX0" fmla="*/ 0 w 243075"/>
-              <a:gd name="connsiteY0" fmla="*/ 626807 h 626807"/>
-              <a:gd name="connsiteX1" fmla="*/ 206478 w 243075"/>
-              <a:gd name="connsiteY1" fmla="*/ 324465 h 626807"/>
-              <a:gd name="connsiteX2" fmla="*/ 235974 w 243075"/>
-              <a:gd name="connsiteY2" fmla="*/ 0 h 626807"/>
-            </a:gdLst>
-            <a:ahLst/>
-            <a:cxnLst>
-              <a:cxn ang="0">
-                <a:pos x="connsiteX0" y="connsiteY0"/>
-              </a:cxn>
-              <a:cxn ang="0">
-                <a:pos x="connsiteX1" y="connsiteY1"/>
-              </a:cxn>
-              <a:cxn ang="0">
-                <a:pos x="connsiteX2" y="connsiteY2"/>
-              </a:cxn>
-            </a:cxnLst>
-            <a:rect l="l" t="t" r="r" b="b"/>
-            <a:pathLst>
-              <a:path w="243075" h="626807">
-                <a:moveTo>
-                  <a:pt x="0" y="626807"/>
-                </a:moveTo>
-                <a:cubicBezTo>
-                  <a:pt x="83574" y="527870"/>
-                  <a:pt x="167149" y="428933"/>
-                  <a:pt x="206478" y="324465"/>
-                </a:cubicBezTo>
-                <a:cubicBezTo>
-                  <a:pt x="245807" y="219997"/>
-                  <a:pt x="249493" y="74971"/>
-                  <a:pt x="235974" y="0"/>
-                </a:cubicBezTo>
-              </a:path>
-            </a:pathLst>
-          </a:custGeom>
-        </p:spPr>
-        <p:style>
-          <a:lnRef idx="1">
-            <a:schemeClr val="dk1"/>
-          </a:lnRef>
-          <a:fillRef idx="0">
-            <a:schemeClr val="dk1"/>
-          </a:fillRef>
-          <a:effectRef idx="0">
-            <a:schemeClr val="dk1"/>
-          </a:effectRef>
-          <a:fontRef idx="minor">
-            <a:schemeClr val="tx1"/>
-          </a:fontRef>
-        </p:style>
-        <p:txBody>
-          <a:bodyPr rtlCol="0" anchor="ctr"/>
-          <a:lstStyle/>
-          <a:p>
-            <a:pPr algn="ctr"/>
-            <a:endParaRPr lang="en-US"/>
-          </a:p>
-        </p:txBody>
-      </p:sp>
-      <p:sp>
-        <p:nvSpPr>
-          <p:cNvPr id="66" name="Oval 65">
-            <a:extLst>
-              <a:ext uri="{FF2B5EF4-FFF2-40B4-BE49-F238E27FC236}">
-                <a16:creationId xmlns:a16="http://schemas.microsoft.com/office/drawing/2014/main" id="{4EDBEB9A-425F-D240-94A9-02741E44CE33}"/>
-              </a:ext>
-            </a:extLst>
-          </p:cNvPr>
-          <p:cNvSpPr>
-            <a:spLocks noChangeAspect="1"/>
-          </p:cNvSpPr>
-          <p:nvPr/>
-        </p:nvSpPr>
-        <p:spPr>
-          <a:xfrm>
-            <a:off x="5295340" y="1671677"/>
+            <a:off x="5701894" y="1992537"/>
             <a:ext cx="91440" cy="91440"/>
           </a:xfrm>
           <a:prstGeom prst="ellipse">
@@ -5485,7 +4747,7 @@
         </p:nvSpPr>
         <p:spPr>
           <a:xfrm>
-            <a:off x="5904954" y="2231570"/>
+            <a:off x="6407269" y="2449918"/>
             <a:ext cx="91440" cy="91440"/>
           </a:xfrm>
           <a:prstGeom prst="ellipse">
@@ -5539,7 +4801,7 @@
         </p:nvSpPr>
         <p:spPr>
           <a:xfrm>
-            <a:off x="5535051" y="2015611"/>
+            <a:off x="5953306" y="2358478"/>
             <a:ext cx="91440" cy="91440"/>
           </a:xfrm>
           <a:prstGeom prst="ellipse">
@@ -5652,6 +4914,443 @@
           </a:fontRef>
         </p:style>
       </p:cxnSp>
+      <p:sp>
+        <p:nvSpPr>
+          <p:cNvPr id="3" name="Arc 2">
+            <a:extLst>
+              <a:ext uri="{FF2B5EF4-FFF2-40B4-BE49-F238E27FC236}">
+                <a16:creationId xmlns:a16="http://schemas.microsoft.com/office/drawing/2014/main" id="{0E39A623-CE84-7044-92B6-98618575A512}"/>
+              </a:ext>
+            </a:extLst>
+          </p:cNvPr>
+          <p:cNvSpPr/>
+          <p:nvPr/>
+        </p:nvSpPr>
+        <p:spPr>
+          <a:xfrm>
+            <a:off x="4462504" y="2960451"/>
+            <a:ext cx="914400" cy="914400"/>
+          </a:xfrm>
+          <a:prstGeom prst="arc">
+            <a:avLst>
+              <a:gd name="adj1" fmla="val 16200000"/>
+              <a:gd name="adj2" fmla="val 19578598"/>
+            </a:avLst>
+          </a:prstGeom>
+        </p:spPr>
+        <p:style>
+          <a:lnRef idx="1">
+            <a:schemeClr val="dk1"/>
+          </a:lnRef>
+          <a:fillRef idx="0">
+            <a:schemeClr val="dk1"/>
+          </a:fillRef>
+          <a:effectRef idx="0">
+            <a:schemeClr val="dk1"/>
+          </a:effectRef>
+          <a:fontRef idx="minor">
+            <a:schemeClr val="tx1"/>
+          </a:fontRef>
+        </p:style>
+        <p:txBody>
+          <a:bodyPr rtlCol="0" anchor="ctr"/>
+          <a:lstStyle/>
+          <a:p>
+            <a:pPr algn="ctr"/>
+            <a:endParaRPr lang="en-US"/>
+          </a:p>
+        </p:txBody>
+      </p:sp>
+      <p:sp>
+        <p:nvSpPr>
+          <p:cNvPr id="47" name="Arc 46">
+            <a:extLst>
+              <a:ext uri="{FF2B5EF4-FFF2-40B4-BE49-F238E27FC236}">
+                <a16:creationId xmlns:a16="http://schemas.microsoft.com/office/drawing/2014/main" id="{8DDFCFCE-50EB-8049-8396-CACD2646F65F}"/>
+              </a:ext>
+            </a:extLst>
+          </p:cNvPr>
+          <p:cNvSpPr/>
+          <p:nvPr/>
+        </p:nvSpPr>
+        <p:spPr>
+          <a:xfrm>
+            <a:off x="4403846" y="2965584"/>
+            <a:ext cx="914400" cy="914400"/>
+          </a:xfrm>
+          <a:prstGeom prst="arc">
+            <a:avLst>
+              <a:gd name="adj1" fmla="val 11262717"/>
+              <a:gd name="adj2" fmla="val 16166826"/>
+            </a:avLst>
+          </a:prstGeom>
+        </p:spPr>
+        <p:style>
+          <a:lnRef idx="1">
+            <a:schemeClr val="dk1"/>
+          </a:lnRef>
+          <a:fillRef idx="0">
+            <a:schemeClr val="dk1"/>
+          </a:fillRef>
+          <a:effectRef idx="0">
+            <a:schemeClr val="dk1"/>
+          </a:effectRef>
+          <a:fontRef idx="minor">
+            <a:schemeClr val="tx1"/>
+          </a:fontRef>
+        </p:style>
+        <p:txBody>
+          <a:bodyPr rtlCol="0" anchor="ctr"/>
+          <a:lstStyle/>
+          <a:p>
+            <a:pPr algn="ctr"/>
+            <a:endParaRPr lang="en-US"/>
+          </a:p>
+        </p:txBody>
+      </p:sp>
+      <p:sp>
+        <p:nvSpPr>
+          <p:cNvPr id="49" name="Arc 48">
+            <a:extLst>
+              <a:ext uri="{FF2B5EF4-FFF2-40B4-BE49-F238E27FC236}">
+                <a16:creationId xmlns:a16="http://schemas.microsoft.com/office/drawing/2014/main" id="{E493B995-8699-2C45-A781-1F43C591AC05}"/>
+              </a:ext>
+            </a:extLst>
+          </p:cNvPr>
+          <p:cNvSpPr>
+            <a:spLocks noChangeAspect="1"/>
+          </p:cNvSpPr>
+          <p:nvPr/>
+        </p:nvSpPr>
+        <p:spPr>
+          <a:xfrm>
+            <a:off x="4320357" y="2954167"/>
+            <a:ext cx="1097280" cy="1097280"/>
+          </a:xfrm>
+          <a:prstGeom prst="arc">
+            <a:avLst>
+              <a:gd name="adj1" fmla="val 19781617"/>
+              <a:gd name="adj2" fmla="val 717256"/>
+            </a:avLst>
+          </a:prstGeom>
+        </p:spPr>
+        <p:style>
+          <a:lnRef idx="1">
+            <a:schemeClr val="dk1"/>
+          </a:lnRef>
+          <a:fillRef idx="0">
+            <a:schemeClr val="dk1"/>
+          </a:fillRef>
+          <a:effectRef idx="0">
+            <a:schemeClr val="dk1"/>
+          </a:effectRef>
+          <a:fontRef idx="minor">
+            <a:schemeClr val="tx1"/>
+          </a:fontRef>
+        </p:style>
+        <p:txBody>
+          <a:bodyPr rtlCol="0" anchor="ctr"/>
+          <a:lstStyle/>
+          <a:p>
+            <a:pPr algn="ctr"/>
+            <a:endParaRPr lang="en-US"/>
+          </a:p>
+        </p:txBody>
+      </p:sp>
+      <p:sp>
+        <p:nvSpPr>
+          <p:cNvPr id="62" name="Arc 61">
+            <a:extLst>
+              <a:ext uri="{FF2B5EF4-FFF2-40B4-BE49-F238E27FC236}">
+                <a16:creationId xmlns:a16="http://schemas.microsoft.com/office/drawing/2014/main" id="{315A7C24-BF48-8641-8C73-EF7926DDB454}"/>
+              </a:ext>
+            </a:extLst>
+          </p:cNvPr>
+          <p:cNvSpPr>
+            <a:spLocks noChangeAspect="1"/>
+          </p:cNvSpPr>
+          <p:nvPr/>
+        </p:nvSpPr>
+        <p:spPr>
+          <a:xfrm>
+            <a:off x="5328029" y="2848031"/>
+            <a:ext cx="548640" cy="548640"/>
+          </a:xfrm>
+          <a:prstGeom prst="arc">
+            <a:avLst>
+              <a:gd name="adj1" fmla="val 4636578"/>
+              <a:gd name="adj2" fmla="val 9536749"/>
+            </a:avLst>
+          </a:prstGeom>
+        </p:spPr>
+        <p:style>
+          <a:lnRef idx="1">
+            <a:schemeClr val="dk1"/>
+          </a:lnRef>
+          <a:fillRef idx="0">
+            <a:schemeClr val="dk1"/>
+          </a:fillRef>
+          <a:effectRef idx="0">
+            <a:schemeClr val="dk1"/>
+          </a:effectRef>
+          <a:fontRef idx="minor">
+            <a:schemeClr val="tx1"/>
+          </a:fontRef>
+        </p:style>
+        <p:txBody>
+          <a:bodyPr rtlCol="0" anchor="ctr"/>
+          <a:lstStyle/>
+          <a:p>
+            <a:pPr algn="ctr"/>
+            <a:endParaRPr lang="en-US"/>
+          </a:p>
+        </p:txBody>
+      </p:sp>
+      <p:sp>
+        <p:nvSpPr>
+          <p:cNvPr id="71" name="Arc 70">
+            <a:extLst>
+              <a:ext uri="{FF2B5EF4-FFF2-40B4-BE49-F238E27FC236}">
+                <a16:creationId xmlns:a16="http://schemas.microsoft.com/office/drawing/2014/main" id="{186E868B-C47F-834D-BDA0-2BEE24BC9C3A}"/>
+              </a:ext>
+            </a:extLst>
+          </p:cNvPr>
+          <p:cNvSpPr>
+            <a:spLocks noChangeAspect="1"/>
+          </p:cNvSpPr>
+          <p:nvPr/>
+        </p:nvSpPr>
+        <p:spPr>
+          <a:xfrm>
+            <a:off x="4309014" y="1870799"/>
+            <a:ext cx="1097280" cy="1097280"/>
+          </a:xfrm>
+          <a:prstGeom prst="arc">
+            <a:avLst>
+              <a:gd name="adj1" fmla="val 5462117"/>
+              <a:gd name="adj2" fmla="val 9782840"/>
+            </a:avLst>
+          </a:prstGeom>
+        </p:spPr>
+        <p:style>
+          <a:lnRef idx="1">
+            <a:schemeClr val="dk1"/>
+          </a:lnRef>
+          <a:fillRef idx="0">
+            <a:schemeClr val="dk1"/>
+          </a:fillRef>
+          <a:effectRef idx="0">
+            <a:schemeClr val="dk1"/>
+          </a:effectRef>
+          <a:fontRef idx="minor">
+            <a:schemeClr val="tx1"/>
+          </a:fontRef>
+        </p:style>
+        <p:txBody>
+          <a:bodyPr rtlCol="0" anchor="ctr"/>
+          <a:lstStyle/>
+          <a:p>
+            <a:pPr algn="ctr"/>
+            <a:endParaRPr lang="en-US"/>
+          </a:p>
+        </p:txBody>
+      </p:sp>
+      <p:sp>
+        <p:nvSpPr>
+          <p:cNvPr id="72" name="Arc 71">
+            <a:extLst>
+              <a:ext uri="{FF2B5EF4-FFF2-40B4-BE49-F238E27FC236}">
+                <a16:creationId xmlns:a16="http://schemas.microsoft.com/office/drawing/2014/main" id="{F395D320-77D6-4543-8909-1BBCF7260C62}"/>
+              </a:ext>
+            </a:extLst>
+          </p:cNvPr>
+          <p:cNvSpPr>
+            <a:spLocks noChangeAspect="1"/>
+          </p:cNvSpPr>
+          <p:nvPr/>
+        </p:nvSpPr>
+        <p:spPr>
+          <a:xfrm>
+            <a:off x="4162783" y="1405151"/>
+            <a:ext cx="1554480" cy="1554480"/>
+          </a:xfrm>
+          <a:prstGeom prst="arc">
+            <a:avLst>
+              <a:gd name="adj1" fmla="val 2985480"/>
+              <a:gd name="adj2" fmla="val 5413617"/>
+            </a:avLst>
+          </a:prstGeom>
+        </p:spPr>
+        <p:style>
+          <a:lnRef idx="1">
+            <a:schemeClr val="dk1"/>
+          </a:lnRef>
+          <a:fillRef idx="0">
+            <a:schemeClr val="dk1"/>
+          </a:fillRef>
+          <a:effectRef idx="0">
+            <a:schemeClr val="dk1"/>
+          </a:effectRef>
+          <a:fontRef idx="minor">
+            <a:schemeClr val="tx1"/>
+          </a:fontRef>
+        </p:style>
+        <p:txBody>
+          <a:bodyPr rtlCol="0" anchor="ctr"/>
+          <a:lstStyle/>
+          <a:p>
+            <a:pPr algn="ctr"/>
+            <a:endParaRPr lang="en-US"/>
+          </a:p>
+        </p:txBody>
+      </p:sp>
+      <p:sp>
+        <p:nvSpPr>
+          <p:cNvPr id="73" name="Arc 72">
+            <a:extLst>
+              <a:ext uri="{FF2B5EF4-FFF2-40B4-BE49-F238E27FC236}">
+                <a16:creationId xmlns:a16="http://schemas.microsoft.com/office/drawing/2014/main" id="{DC91AFF6-ED9C-3A41-BEFA-0F85BB2EBDAC}"/>
+              </a:ext>
+            </a:extLst>
+          </p:cNvPr>
+          <p:cNvSpPr>
+            <a:spLocks noChangeAspect="1"/>
+          </p:cNvSpPr>
+          <p:nvPr/>
+        </p:nvSpPr>
+        <p:spPr>
+          <a:xfrm>
+            <a:off x="4193134" y="1374485"/>
+            <a:ext cx="1554480" cy="1554480"/>
+          </a:xfrm>
+          <a:prstGeom prst="arc">
+            <a:avLst>
+              <a:gd name="adj1" fmla="val 21271527"/>
+              <a:gd name="adj2" fmla="val 2747725"/>
+            </a:avLst>
+          </a:prstGeom>
+        </p:spPr>
+        <p:style>
+          <a:lnRef idx="1">
+            <a:schemeClr val="dk1"/>
+          </a:lnRef>
+          <a:fillRef idx="0">
+            <a:schemeClr val="dk1"/>
+          </a:fillRef>
+          <a:effectRef idx="0">
+            <a:schemeClr val="dk1"/>
+          </a:effectRef>
+          <a:fontRef idx="minor">
+            <a:schemeClr val="tx1"/>
+          </a:fontRef>
+        </p:style>
+        <p:txBody>
+          <a:bodyPr rtlCol="0" anchor="ctr"/>
+          <a:lstStyle/>
+          <a:p>
+            <a:pPr algn="ctr"/>
+            <a:endParaRPr lang="en-US"/>
+          </a:p>
+        </p:txBody>
+      </p:sp>
+      <p:sp>
+        <p:nvSpPr>
+          <p:cNvPr id="74" name="Arc 73">
+            <a:extLst>
+              <a:ext uri="{FF2B5EF4-FFF2-40B4-BE49-F238E27FC236}">
+                <a16:creationId xmlns:a16="http://schemas.microsoft.com/office/drawing/2014/main" id="{B91FC905-4459-AD4E-9239-D84D0BF54037}"/>
+              </a:ext>
+            </a:extLst>
+          </p:cNvPr>
+          <p:cNvSpPr>
+            <a:spLocks noChangeAspect="1"/>
+          </p:cNvSpPr>
+          <p:nvPr/>
+        </p:nvSpPr>
+        <p:spPr>
+          <a:xfrm>
+            <a:off x="5101803" y="2468793"/>
+            <a:ext cx="2194560" cy="2194560"/>
+          </a:xfrm>
+          <a:prstGeom prst="arc">
+            <a:avLst>
+              <a:gd name="adj1" fmla="val 13896208"/>
+              <a:gd name="adj2" fmla="val 16829736"/>
+            </a:avLst>
+          </a:prstGeom>
+        </p:spPr>
+        <p:style>
+          <a:lnRef idx="1">
+            <a:schemeClr val="dk1"/>
+          </a:lnRef>
+          <a:fillRef idx="0">
+            <a:schemeClr val="dk1"/>
+          </a:fillRef>
+          <a:effectRef idx="0">
+            <a:schemeClr val="dk1"/>
+          </a:effectRef>
+          <a:fontRef idx="minor">
+            <a:schemeClr val="tx1"/>
+          </a:fontRef>
+        </p:style>
+        <p:txBody>
+          <a:bodyPr rtlCol="0" anchor="ctr"/>
+          <a:lstStyle/>
+          <a:p>
+            <a:pPr algn="ctr"/>
+            <a:endParaRPr lang="en-US"/>
+          </a:p>
+        </p:txBody>
+      </p:sp>
+      <p:sp>
+        <p:nvSpPr>
+          <p:cNvPr id="75" name="Arc 74">
+            <a:extLst>
+              <a:ext uri="{FF2B5EF4-FFF2-40B4-BE49-F238E27FC236}">
+                <a16:creationId xmlns:a16="http://schemas.microsoft.com/office/drawing/2014/main" id="{64B98E65-77D3-314E-8D6E-179B04AD3BF4}"/>
+              </a:ext>
+            </a:extLst>
+          </p:cNvPr>
+          <p:cNvSpPr>
+            <a:spLocks noChangeAspect="1"/>
+          </p:cNvSpPr>
+          <p:nvPr/>
+        </p:nvSpPr>
+        <p:spPr>
+          <a:xfrm>
+            <a:off x="4832807" y="2290658"/>
+            <a:ext cx="3657600" cy="3657600"/>
+          </a:xfrm>
+          <a:prstGeom prst="arc">
+            <a:avLst>
+              <a:gd name="adj1" fmla="val 13826209"/>
+              <a:gd name="adj2" fmla="val 14825902"/>
+            </a:avLst>
+          </a:prstGeom>
+        </p:spPr>
+        <p:style>
+          <a:lnRef idx="1">
+            <a:schemeClr val="dk1"/>
+          </a:lnRef>
+          <a:fillRef idx="0">
+            <a:schemeClr val="dk1"/>
+          </a:fillRef>
+          <a:effectRef idx="0">
+            <a:schemeClr val="dk1"/>
+          </a:effectRef>
+          <a:fontRef idx="minor">
+            <a:schemeClr val="tx1"/>
+          </a:fontRef>
+        </p:style>
+        <p:txBody>
+          <a:bodyPr rtlCol="0" anchor="ctr"/>
+          <a:lstStyle/>
+          <a:p>
+            <a:pPr algn="ctr"/>
+            <a:endParaRPr lang="en-US"/>
+          </a:p>
+        </p:txBody>
+      </p:sp>
     </p:spTree>
     <p:extLst>
       <p:ext uri="{BB962C8B-B14F-4D97-AF65-F5344CB8AC3E}">
@@ -6070,7 +5769,7 @@
                                 </p:cTn>
                               </p:par>
                               <p:par>
-                                <p:cTn id="35" presetID="1" presetClass="entr" presetSubtype="0" fill="hold" grpId="0" nodeType="withEffect">
+                                <p:cTn id="35" presetID="1" presetClass="entr" presetSubtype="0" fill="hold" grpId="1" nodeType="withEffect">
                                   <p:stCondLst>
                                     <p:cond delay="0"/>
                                   </p:stCondLst>
@@ -6078,60 +5777,6 @@
                                     <p:set>
                                       <p:cBhvr>
                                         <p:cTn id="36" dur="1" fill="hold">
-                                          <p:stCondLst>
-                                            <p:cond delay="0"/>
-                                          </p:stCondLst>
-                                        </p:cTn>
-                                        <p:tgtEl>
-                                          <p:spTgt spid="65"/>
-                                        </p:tgtEl>
-                                        <p:attrNameLst>
-                                          <p:attrName>style.visibility</p:attrName>
-                                        </p:attrNameLst>
-                                      </p:cBhvr>
-                                      <p:to>
-                                        <p:strVal val="visible"/>
-                                      </p:to>
-                                    </p:set>
-                                  </p:childTnLst>
-                                </p:cTn>
-                              </p:par>
-                              <p:par>
-                                <p:cTn id="37" presetID="1" presetClass="entr" presetSubtype="0" fill="hold" grpId="0" nodeType="withEffect">
-                                  <p:stCondLst>
-                                    <p:cond delay="0"/>
-                                  </p:stCondLst>
-                                  <p:childTnLst>
-                                    <p:set>
-                                      <p:cBhvr>
-                                        <p:cTn id="38" dur="1" fill="hold">
-                                          <p:stCondLst>
-                                            <p:cond delay="0"/>
-                                          </p:stCondLst>
-                                        </p:cTn>
-                                        <p:tgtEl>
-                                          <p:spTgt spid="64"/>
-                                        </p:tgtEl>
-                                        <p:attrNameLst>
-                                          <p:attrName>style.visibility</p:attrName>
-                                        </p:attrNameLst>
-                                      </p:cBhvr>
-                                      <p:to>
-                                        <p:strVal val="visible"/>
-                                      </p:to>
-                                    </p:set>
-                                  </p:childTnLst>
-                                </p:cTn>
-                              </p:par>
-                              <p:par>
-                                <p:cTn id="39" presetID="1" presetClass="entr" presetSubtype="0" fill="hold" grpId="1" nodeType="withEffect">
-                                  <p:stCondLst>
-                                    <p:cond delay="0"/>
-                                  </p:stCondLst>
-                                  <p:childTnLst>
-                                    <p:set>
-                                      <p:cBhvr>
-                                        <p:cTn id="40" dur="1" fill="hold">
                                           <p:stCondLst>
                                             <p:cond delay="0"/>
                                           </p:stCondLst>
@@ -6151,20 +5796,20 @@
                                 </p:cTn>
                               </p:par>
                               <p:par>
-                                <p:cTn id="41" presetID="1" presetClass="entr" presetSubtype="0" fill="hold" grpId="0" nodeType="withEffect">
+                                <p:cTn id="37" presetID="1" presetClass="entr" presetSubtype="0" fill="hold" grpId="1" nodeType="withEffect">
                                   <p:stCondLst>
                                     <p:cond delay="0"/>
                                   </p:stCondLst>
                                   <p:childTnLst>
                                     <p:set>
                                       <p:cBhvr>
-                                        <p:cTn id="42" dur="1" fill="hold">
+                                        <p:cTn id="38" dur="1" fill="hold">
                                           <p:stCondLst>
                                             <p:cond delay="0"/>
                                           </p:stCondLst>
                                         </p:cTn>
                                         <p:tgtEl>
-                                          <p:spTgt spid="63"/>
+                                          <p:spTgt spid="67"/>
                                         </p:tgtEl>
                                         <p:attrNameLst>
                                           <p:attrName>style.visibility</p:attrName>
@@ -6178,7 +5823,61 @@
                                 </p:cTn>
                               </p:par>
                               <p:par>
-                                <p:cTn id="43" presetID="1" presetClass="entr" presetSubtype="0" fill="hold" grpId="1" nodeType="withEffect">
+                                <p:cTn id="39" presetID="1" presetClass="entr" presetSubtype="0" fill="hold" grpId="0" nodeType="withEffect">
+                                  <p:stCondLst>
+                                    <p:cond delay="0"/>
+                                  </p:stCondLst>
+                                  <p:childTnLst>
+                                    <p:set>
+                                      <p:cBhvr>
+                                        <p:cTn id="40" dur="1" fill="hold">
+                                          <p:stCondLst>
+                                            <p:cond delay="0"/>
+                                          </p:stCondLst>
+                                        </p:cTn>
+                                        <p:tgtEl>
+                                          <p:spTgt spid="69"/>
+                                        </p:tgtEl>
+                                        <p:attrNameLst>
+                                          <p:attrName>style.visibility</p:attrName>
+                                        </p:attrNameLst>
+                                      </p:cBhvr>
+                                      <p:to>
+                                        <p:strVal val="visible"/>
+                                      </p:to>
+                                    </p:set>
+                                  </p:childTnLst>
+                                </p:cTn>
+                              </p:par>
+                              <p:par>
+                                <p:cTn id="41" presetID="1" presetClass="exit" presetSubtype="0" fill="hold" grpId="1" nodeType="withEffect">
+                                  <p:stCondLst>
+                                    <p:cond delay="0"/>
+                                  </p:stCondLst>
+                                  <p:childTnLst>
+                                    <p:set>
+                                      <p:cBhvr>
+                                        <p:cTn id="42" dur="1" fill="hold">
+                                          <p:stCondLst>
+                                            <p:cond delay="0"/>
+                                          </p:stCondLst>
+                                        </p:cTn>
+                                        <p:tgtEl>
+                                          <p:spTgt spid="69"/>
+                                        </p:tgtEl>
+                                        <p:attrNameLst>
+                                          <p:attrName>style.visibility</p:attrName>
+                                        </p:attrNameLst>
+                                      </p:cBhvr>
+                                      <p:to>
+                                        <p:strVal val="hidden"/>
+                                      </p:to>
+                                    </p:set>
+                                  </p:childTnLst>
+                                </p:cTn>
+                              </p:par>
+                              <p:par>
+                                <p:cTn id="43" presetID="1" presetClass="entr" presetSubtype="0" fill="hold" grpId="0" nodeType="withEffect">
                                   <p:stCondLst>
                                     <p:cond delay="0"/>
                                   </p:stCondLst>
@@ -6191,7 +5890,7 @@
                                           </p:stCondLst>
                                         </p:cTn>
                                         <p:tgtEl>
-                                          <p:spTgt spid="67"/>
+                                          <p:spTgt spid="74"/>
                                         </p:tgtEl>
                                         <p:attrNameLst>
                                           <p:attrName>style.visibility</p:attrName>
@@ -6218,7 +5917,7 @@
                                           </p:stCondLst>
                                         </p:cTn>
                                         <p:tgtEl>
-                                          <p:spTgt spid="69"/>
+                                          <p:spTgt spid="75"/>
                                         </p:tgtEl>
                                         <p:attrNameLst>
                                           <p:attrName>style.visibility</p:attrName>
@@ -6232,7 +5931,7 @@
                                 </p:cTn>
                               </p:par>
                               <p:par>
-                                <p:cTn id="47" presetID="1" presetClass="exit" presetSubtype="0" fill="hold" grpId="1" nodeType="withEffect">
+                                <p:cTn id="47" presetID="1" presetClass="entr" presetSubtype="0" fill="hold" grpId="0" nodeType="withEffect">
                                   <p:stCondLst>
                                     <p:cond delay="0"/>
                                   </p:stCondLst>
@@ -6245,14 +5944,14 @@
                                           </p:stCondLst>
                                         </p:cTn>
                                         <p:tgtEl>
-                                          <p:spTgt spid="69"/>
+                                          <p:spTgt spid="73"/>
                                         </p:tgtEl>
                                         <p:attrNameLst>
                                           <p:attrName>style.visibility</p:attrName>
                                         </p:attrNameLst>
                                       </p:cBhvr>
                                       <p:to>
-                                        <p:strVal val="hidden"/>
+                                        <p:strVal val="visible"/>
                                       </p:to>
                                     </p:set>
                                   </p:childTnLst>
@@ -6331,7 +6030,7 @@
                                 </p:cTn>
                               </p:par>
                               <p:par>
-                                <p:cTn id="55" presetID="1" presetClass="exit" presetSubtype="0" fill="hold" grpId="1" nodeType="withEffect">
+                                <p:cTn id="55" presetID="1" presetClass="exit" presetSubtype="0" fill="hold" grpId="2" nodeType="withEffect">
                                   <p:stCondLst>
                                     <p:cond delay="0"/>
                                   </p:stCondLst>
@@ -6344,7 +6043,7 @@
                                           </p:stCondLst>
                                         </p:cTn>
                                         <p:tgtEl>
-                                          <p:spTgt spid="65"/>
+                                          <p:spTgt spid="66"/>
                                         </p:tgtEl>
                                         <p:attrNameLst>
                                           <p:attrName>style.visibility</p:attrName>
@@ -6371,60 +6070,6 @@
                                           </p:stCondLst>
                                         </p:cTn>
                                         <p:tgtEl>
-                                          <p:spTgt spid="66"/>
-                                        </p:tgtEl>
-                                        <p:attrNameLst>
-                                          <p:attrName>style.visibility</p:attrName>
-                                        </p:attrNameLst>
-                                      </p:cBhvr>
-                                      <p:to>
-                                        <p:strVal val="hidden"/>
-                                      </p:to>
-                                    </p:set>
-                                  </p:childTnLst>
-                                </p:cTn>
-                              </p:par>
-                              <p:par>
-                                <p:cTn id="59" presetID="1" presetClass="exit" presetSubtype="0" fill="hold" grpId="1" nodeType="withEffect">
-                                  <p:stCondLst>
-                                    <p:cond delay="0"/>
-                                  </p:stCondLst>
-                                  <p:childTnLst>
-                                    <p:set>
-                                      <p:cBhvr>
-                                        <p:cTn id="60" dur="1" fill="hold">
-                                          <p:stCondLst>
-                                            <p:cond delay="0"/>
-                                          </p:stCondLst>
-                                        </p:cTn>
-                                        <p:tgtEl>
-                                          <p:spTgt spid="63"/>
-                                        </p:tgtEl>
-                                        <p:attrNameLst>
-                                          <p:attrName>style.visibility</p:attrName>
-                                        </p:attrNameLst>
-                                      </p:cBhvr>
-                                      <p:to>
-                                        <p:strVal val="hidden"/>
-                                      </p:to>
-                                    </p:set>
-                                  </p:childTnLst>
-                                </p:cTn>
-                              </p:par>
-                              <p:par>
-                                <p:cTn id="61" presetID="1" presetClass="exit" presetSubtype="0" fill="hold" grpId="2" nodeType="withEffect">
-                                  <p:stCondLst>
-                                    <p:cond delay="0"/>
-                                  </p:stCondLst>
-                                  <p:childTnLst>
-                                    <p:set>
-                                      <p:cBhvr>
-                                        <p:cTn id="62" dur="1" fill="hold">
-                                          <p:stCondLst>
-                                            <p:cond delay="0"/>
-                                          </p:stCondLst>
-                                        </p:cTn>
-                                        <p:tgtEl>
                                           <p:spTgt spid="67"/>
                                         </p:tgtEl>
                                         <p:attrNameLst>
@@ -6439,14 +6084,14 @@
                                 </p:cTn>
                               </p:par>
                               <p:par>
-                                <p:cTn id="63" presetID="1" presetClass="entr" presetSubtype="0" fill="hold" nodeType="withEffect">
+                                <p:cTn id="59" presetID="1" presetClass="entr" presetSubtype="0" fill="hold" nodeType="withEffect">
                                   <p:stCondLst>
                                     <p:cond delay="0"/>
                                   </p:stCondLst>
                                   <p:childTnLst>
                                     <p:set>
                                       <p:cBhvr>
-                                        <p:cTn id="64" dur="1" fill="hold">
+                                        <p:cTn id="60" dur="1" fill="hold">
                                           <p:stCondLst>
                                             <p:cond delay="0"/>
                                           </p:stCondLst>
@@ -6466,6 +6111,60 @@
                                 </p:cTn>
                               </p:par>
                               <p:par>
+                                <p:cTn id="61" presetID="1" presetClass="exit" presetSubtype="0" fill="hold" grpId="1" nodeType="withEffect">
+                                  <p:stCondLst>
+                                    <p:cond delay="0"/>
+                                  </p:stCondLst>
+                                  <p:childTnLst>
+                                    <p:set>
+                                      <p:cBhvr>
+                                        <p:cTn id="62" dur="1" fill="hold">
+                                          <p:stCondLst>
+                                            <p:cond delay="0"/>
+                                          </p:stCondLst>
+                                        </p:cTn>
+                                        <p:tgtEl>
+                                          <p:spTgt spid="44"/>
+                                        </p:tgtEl>
+                                        <p:attrNameLst>
+                                          <p:attrName>style.visibility</p:attrName>
+                                        </p:attrNameLst>
+                                      </p:cBhvr>
+                                      <p:to>
+                                        <p:strVal val="hidden"/>
+                                      </p:to>
+                                    </p:set>
+                                  </p:childTnLst>
+                                </p:cTn>
+                              </p:par>
+                              <p:par>
+                                <p:cTn id="63" presetID="1" presetClass="exit" presetSubtype="0" fill="hold" grpId="1" nodeType="withEffect">
+                                  <p:stCondLst>
+                                    <p:cond delay="0"/>
+                                  </p:stCondLst>
+                                  <p:childTnLst>
+                                    <p:set>
+                                      <p:cBhvr>
+                                        <p:cTn id="64" dur="1" fill="hold">
+                                          <p:stCondLst>
+                                            <p:cond delay="0"/>
+                                          </p:stCondLst>
+                                        </p:cTn>
+                                        <p:tgtEl>
+                                          <p:spTgt spid="74"/>
+                                        </p:tgtEl>
+                                        <p:attrNameLst>
+                                          <p:attrName>style.visibility</p:attrName>
+                                        </p:attrNameLst>
+                                      </p:cBhvr>
+                                      <p:to>
+                                        <p:strVal val="hidden"/>
+                                      </p:to>
+                                    </p:set>
+                                  </p:childTnLst>
+                                </p:cTn>
+                              </p:par>
+                              <p:par>
                                 <p:cTn id="65" presetID="1" presetClass="exit" presetSubtype="0" fill="hold" grpId="1" nodeType="withEffect">
                                   <p:stCondLst>
                                     <p:cond delay="0"/>
@@ -6479,7 +6178,7 @@
                                           </p:stCondLst>
                                         </p:cTn>
                                         <p:tgtEl>
-                                          <p:spTgt spid="44"/>
+                                          <p:spTgt spid="73"/>
                                         </p:tgtEl>
                                         <p:attrNameLst>
                                           <p:attrName>style.visibility</p:attrName>
@@ -6531,11 +6230,6 @@
       <p:bldP spid="60" grpId="0" animBg="1"/>
       <p:bldP spid="61" grpId="0"/>
       <p:bldP spid="61" grpId="1"/>
-      <p:bldP spid="63" grpId="0" animBg="1"/>
-      <p:bldP spid="63" grpId="1" animBg="1"/>
-      <p:bldP spid="64" grpId="0" animBg="1"/>
-      <p:bldP spid="65" grpId="0" animBg="1"/>
-      <p:bldP spid="65" grpId="1" animBg="1"/>
       <p:bldP spid="66" grpId="0" animBg="1"/>
       <p:bldP spid="66" grpId="1" animBg="1"/>
       <p:bldP spid="66" grpId="2" animBg="1"/>
@@ -6547,6 +6241,11 @@
       <p:bldP spid="69" grpId="0"/>
       <p:bldP spid="69" grpId="1"/>
       <p:bldP spid="69" grpId="2"/>
+      <p:bldP spid="73" grpId="0" animBg="1"/>
+      <p:bldP spid="73" grpId="1" animBg="1"/>
+      <p:bldP spid="74" grpId="0" animBg="1"/>
+      <p:bldP spid="74" grpId="1" animBg="1"/>
+      <p:bldP spid="75" grpId="0" animBg="1"/>
     </p:bldLst>
   </p:timing>
 </p:sld>

</xml_diff>

<commit_message>
move random sampled point in chap11_fig4 further away from RRT tree
</commit_message>
<xml_diff>
--- a/figures/planning/Yixuan_chap11.pptx
+++ b/figures/planning/Yixuan_chap11.pptx
@@ -260,7 +260,7 @@
           <a:p>
             <a:fld id="{3A84BA4E-469E-5F47-AD9B-2DCACC25D4EA}" type="datetimeFigureOut">
               <a:rPr lang="en-US" smtClean="0"/>
-              <a:t>2/4/22</a:t>
+              <a:t>2/18/22</a:t>
             </a:fld>
             <a:endParaRPr lang="en-US"/>
           </a:p>
@@ -458,7 +458,7 @@
           <a:p>
             <a:fld id="{3A84BA4E-469E-5F47-AD9B-2DCACC25D4EA}" type="datetimeFigureOut">
               <a:rPr lang="en-US" smtClean="0"/>
-              <a:t>2/4/22</a:t>
+              <a:t>2/18/22</a:t>
             </a:fld>
             <a:endParaRPr lang="en-US"/>
           </a:p>
@@ -666,7 +666,7 @@
           <a:p>
             <a:fld id="{3A84BA4E-469E-5F47-AD9B-2DCACC25D4EA}" type="datetimeFigureOut">
               <a:rPr lang="en-US" smtClean="0"/>
-              <a:t>2/4/22</a:t>
+              <a:t>2/18/22</a:t>
             </a:fld>
             <a:endParaRPr lang="en-US"/>
           </a:p>
@@ -864,7 +864,7 @@
           <a:p>
             <a:fld id="{3A84BA4E-469E-5F47-AD9B-2DCACC25D4EA}" type="datetimeFigureOut">
               <a:rPr lang="en-US" smtClean="0"/>
-              <a:t>2/4/22</a:t>
+              <a:t>2/18/22</a:t>
             </a:fld>
             <a:endParaRPr lang="en-US"/>
           </a:p>
@@ -1139,7 +1139,7 @@
           <a:p>
             <a:fld id="{3A84BA4E-469E-5F47-AD9B-2DCACC25D4EA}" type="datetimeFigureOut">
               <a:rPr lang="en-US" smtClean="0"/>
-              <a:t>2/4/22</a:t>
+              <a:t>2/18/22</a:t>
             </a:fld>
             <a:endParaRPr lang="en-US"/>
           </a:p>
@@ -1404,7 +1404,7 @@
           <a:p>
             <a:fld id="{3A84BA4E-469E-5F47-AD9B-2DCACC25D4EA}" type="datetimeFigureOut">
               <a:rPr lang="en-US" smtClean="0"/>
-              <a:t>2/4/22</a:t>
+              <a:t>2/18/22</a:t>
             </a:fld>
             <a:endParaRPr lang="en-US"/>
           </a:p>
@@ -1816,7 +1816,7 @@
           <a:p>
             <a:fld id="{3A84BA4E-469E-5F47-AD9B-2DCACC25D4EA}" type="datetimeFigureOut">
               <a:rPr lang="en-US" smtClean="0"/>
-              <a:t>2/4/22</a:t>
+              <a:t>2/18/22</a:t>
             </a:fld>
             <a:endParaRPr lang="en-US"/>
           </a:p>
@@ -1957,7 +1957,7 @@
           <a:p>
             <a:fld id="{3A84BA4E-469E-5F47-AD9B-2DCACC25D4EA}" type="datetimeFigureOut">
               <a:rPr lang="en-US" smtClean="0"/>
-              <a:t>2/4/22</a:t>
+              <a:t>2/18/22</a:t>
             </a:fld>
             <a:endParaRPr lang="en-US"/>
           </a:p>
@@ -2070,7 +2070,7 @@
           <a:p>
             <a:fld id="{3A84BA4E-469E-5F47-AD9B-2DCACC25D4EA}" type="datetimeFigureOut">
               <a:rPr lang="en-US" smtClean="0"/>
-              <a:t>2/4/22</a:t>
+              <a:t>2/18/22</a:t>
             </a:fld>
             <a:endParaRPr lang="en-US"/>
           </a:p>
@@ -2381,7 +2381,7 @@
           <a:p>
             <a:fld id="{3A84BA4E-469E-5F47-AD9B-2DCACC25D4EA}" type="datetimeFigureOut">
               <a:rPr lang="en-US" smtClean="0"/>
-              <a:t>2/4/22</a:t>
+              <a:t>2/18/22</a:t>
             </a:fld>
             <a:endParaRPr lang="en-US"/>
           </a:p>
@@ -2669,7 +2669,7 @@
           <a:p>
             <a:fld id="{3A84BA4E-469E-5F47-AD9B-2DCACC25D4EA}" type="datetimeFigureOut">
               <a:rPr lang="en-US" smtClean="0"/>
-              <a:t>2/4/22</a:t>
+              <a:t>2/18/22</a:t>
             </a:fld>
             <a:endParaRPr lang="en-US"/>
           </a:p>
@@ -2910,7 +2910,7 @@
           <a:p>
             <a:fld id="{3A84BA4E-469E-5F47-AD9B-2DCACC25D4EA}" type="datetimeFigureOut">
               <a:rPr lang="en-US" smtClean="0"/>
-              <a:t>2/4/22</a:t>
+              <a:t>2/18/22</a:t>
             </a:fld>
             <a:endParaRPr lang="en-US"/>
           </a:p>
@@ -4351,7 +4351,7 @@
         </p:nvSpPr>
         <p:spPr>
           <a:xfrm>
-            <a:off x="5999026" y="2310879"/>
+            <a:off x="6060811" y="2150238"/>
             <a:ext cx="91440" cy="91440"/>
           </a:xfrm>
           <a:prstGeom prst="ellipse">

</xml_diff>